<commit_message>
NuGet v2.2.1.6, DataFromJson<T> method
</commit_message>
<xml_diff>
--- a/assets/icon.pptx
+++ b/assets/icon.pptx
@@ -129,7 +129,7 @@
           <p:cNvPr id="2" name="Title 1">
             <a:extLst>
               <a:ext uri="{FF2B5EF4-FFF2-40B4-BE49-F238E27FC236}">
-                <a16:creationId xmlns:a16="http://schemas.microsoft.com/office/drawing/2014/main" id="{E9574AE6-FDB1-4211-AC19-3BF84025C3FE}"/>
+                <a16:creationId xmlns:a16="http://schemas.microsoft.com/office/drawing/2014/main" id="{9CF91839-6FC2-487F-8F2F-24FEC0ABDE4F}"/>
               </a:ext>
             </a:extLst>
           </p:cNvPr>
@@ -166,7 +166,7 @@
           <p:cNvPr id="3" name="Subtitle 2">
             <a:extLst>
               <a:ext uri="{FF2B5EF4-FFF2-40B4-BE49-F238E27FC236}">
-                <a16:creationId xmlns:a16="http://schemas.microsoft.com/office/drawing/2014/main" id="{9F47E527-85A4-4ADA-935A-22DBF6B06B42}"/>
+                <a16:creationId xmlns:a16="http://schemas.microsoft.com/office/drawing/2014/main" id="{B0C14425-2921-41E6-8640-6004196FBB06}"/>
               </a:ext>
             </a:extLst>
           </p:cNvPr>
@@ -236,7 +236,7 @@
           <p:cNvPr id="4" name="Date Placeholder 3">
             <a:extLst>
               <a:ext uri="{FF2B5EF4-FFF2-40B4-BE49-F238E27FC236}">
-                <a16:creationId xmlns:a16="http://schemas.microsoft.com/office/drawing/2014/main" id="{DCC479D2-3154-4CE4-8F1E-968FB4AA3045}"/>
+                <a16:creationId xmlns:a16="http://schemas.microsoft.com/office/drawing/2014/main" id="{5537A8DA-878A-4A21-B970-7923A3315BB1}"/>
               </a:ext>
             </a:extLst>
           </p:cNvPr>
@@ -252,9 +252,9 @@
           <a:bodyPr/>
           <a:lstStyle/>
           <a:p>
-            <a:fld id="{E73E616A-532A-4D23-BBC6-B7182C7A2775}" type="datetimeFigureOut">
+            <a:fld id="{ADF1A577-1697-417D-BE9A-F65F1F01BD18}" type="datetimeFigureOut">
               <a:rPr lang="en-US" smtClean="0"/>
-              <a:t>6/12/2019</a:t>
+              <a:t>1/21/2021</a:t>
             </a:fld>
             <a:endParaRPr lang="en-US"/>
           </a:p>
@@ -265,7 +265,7 @@
           <p:cNvPr id="5" name="Footer Placeholder 4">
             <a:extLst>
               <a:ext uri="{FF2B5EF4-FFF2-40B4-BE49-F238E27FC236}">
-                <a16:creationId xmlns:a16="http://schemas.microsoft.com/office/drawing/2014/main" id="{C2284C7C-4828-4AFD-84D0-E2495D5B652C}"/>
+                <a16:creationId xmlns:a16="http://schemas.microsoft.com/office/drawing/2014/main" id="{FDC587D2-A9AF-4A1F-8526-DE50CFF6617F}"/>
               </a:ext>
             </a:extLst>
           </p:cNvPr>
@@ -290,7 +290,7 @@
           <p:cNvPr id="6" name="Slide Number Placeholder 5">
             <a:extLst>
               <a:ext uri="{FF2B5EF4-FFF2-40B4-BE49-F238E27FC236}">
-                <a16:creationId xmlns:a16="http://schemas.microsoft.com/office/drawing/2014/main" id="{FC1242A5-E9C8-4B42-B2CD-6BFA1FD7F2CE}"/>
+                <a16:creationId xmlns:a16="http://schemas.microsoft.com/office/drawing/2014/main" id="{84B4D443-BE83-40F2-96EB-5D504F0A0753}"/>
               </a:ext>
             </a:extLst>
           </p:cNvPr>
@@ -306,7 +306,7 @@
           <a:bodyPr/>
           <a:lstStyle/>
           <a:p>
-            <a:fld id="{28D51B86-B7C7-42BF-A1EE-4B0CE23BF3F6}" type="slidenum">
+            <a:fld id="{47EAA666-569C-4A93-AF24-072D8E9E9B32}" type="slidenum">
               <a:rPr lang="en-US" smtClean="0"/>
               <a:t>‹#›</a:t>
             </a:fld>
@@ -317,7 +317,7 @@
     </p:spTree>
     <p:extLst>
       <p:ext uri="{BB962C8B-B14F-4D97-AF65-F5344CB8AC3E}">
-        <p14:creationId xmlns:p14="http://schemas.microsoft.com/office/powerpoint/2010/main" val="1276023550"/>
+        <p14:creationId xmlns:p14="http://schemas.microsoft.com/office/powerpoint/2010/main" val="1857954507"/>
       </p:ext>
     </p:extLst>
   </p:cSld>
@@ -349,7 +349,7 @@
           <p:cNvPr id="2" name="Title 1">
             <a:extLst>
               <a:ext uri="{FF2B5EF4-FFF2-40B4-BE49-F238E27FC236}">
-                <a16:creationId xmlns:a16="http://schemas.microsoft.com/office/drawing/2014/main" id="{5765C1D1-0FEC-4E79-89B8-C93D527F30CD}"/>
+                <a16:creationId xmlns:a16="http://schemas.microsoft.com/office/drawing/2014/main" id="{3897D994-DEB3-4CFB-B2DA-546ECFB230A7}"/>
               </a:ext>
             </a:extLst>
           </p:cNvPr>
@@ -377,7 +377,7 @@
           <p:cNvPr id="3" name="Vertical Text Placeholder 2">
             <a:extLst>
               <a:ext uri="{FF2B5EF4-FFF2-40B4-BE49-F238E27FC236}">
-                <a16:creationId xmlns:a16="http://schemas.microsoft.com/office/drawing/2014/main" id="{7ACFF883-A466-4FA2-AC79-96575A9D5352}"/>
+                <a16:creationId xmlns:a16="http://schemas.microsoft.com/office/drawing/2014/main" id="{D0FA1991-D5F0-48C8-9C76-1E0DE9A27F88}"/>
               </a:ext>
             </a:extLst>
           </p:cNvPr>
@@ -396,7 +396,7 @@
             <a:pPr lvl="0"/>
             <a:r>
               <a:rPr lang="en-US"/>
-              <a:t>Edit Master text styles</a:t>
+              <a:t>Click to edit Master text styles</a:t>
             </a:r>
           </a:p>
           <a:p>
@@ -434,7 +434,7 @@
           <p:cNvPr id="4" name="Date Placeholder 3">
             <a:extLst>
               <a:ext uri="{FF2B5EF4-FFF2-40B4-BE49-F238E27FC236}">
-                <a16:creationId xmlns:a16="http://schemas.microsoft.com/office/drawing/2014/main" id="{5510FB83-2D1C-44D7-9F77-F18A8ACCD0D4}"/>
+                <a16:creationId xmlns:a16="http://schemas.microsoft.com/office/drawing/2014/main" id="{AB85A21F-5C3E-469D-A538-87CA00EDCC44}"/>
               </a:ext>
             </a:extLst>
           </p:cNvPr>
@@ -450,9 +450,9 @@
           <a:bodyPr/>
           <a:lstStyle/>
           <a:p>
-            <a:fld id="{E73E616A-532A-4D23-BBC6-B7182C7A2775}" type="datetimeFigureOut">
+            <a:fld id="{ADF1A577-1697-417D-BE9A-F65F1F01BD18}" type="datetimeFigureOut">
               <a:rPr lang="en-US" smtClean="0"/>
-              <a:t>6/12/2019</a:t>
+              <a:t>1/21/2021</a:t>
             </a:fld>
             <a:endParaRPr lang="en-US"/>
           </a:p>
@@ -463,7 +463,7 @@
           <p:cNvPr id="5" name="Footer Placeholder 4">
             <a:extLst>
               <a:ext uri="{FF2B5EF4-FFF2-40B4-BE49-F238E27FC236}">
-                <a16:creationId xmlns:a16="http://schemas.microsoft.com/office/drawing/2014/main" id="{79A1D21B-47DB-4178-B76F-1A0884C09BFB}"/>
+                <a16:creationId xmlns:a16="http://schemas.microsoft.com/office/drawing/2014/main" id="{9017FF0F-524B-464B-A14D-D7DB5D81617F}"/>
               </a:ext>
             </a:extLst>
           </p:cNvPr>
@@ -488,7 +488,7 @@
           <p:cNvPr id="6" name="Slide Number Placeholder 5">
             <a:extLst>
               <a:ext uri="{FF2B5EF4-FFF2-40B4-BE49-F238E27FC236}">
-                <a16:creationId xmlns:a16="http://schemas.microsoft.com/office/drawing/2014/main" id="{A7D2C98D-1DBA-4730-8995-F58213F5D7D7}"/>
+                <a16:creationId xmlns:a16="http://schemas.microsoft.com/office/drawing/2014/main" id="{168CB101-0C6E-4680-A5EB-E3D503EE978A}"/>
               </a:ext>
             </a:extLst>
           </p:cNvPr>
@@ -504,7 +504,7 @@
           <a:bodyPr/>
           <a:lstStyle/>
           <a:p>
-            <a:fld id="{28D51B86-B7C7-42BF-A1EE-4B0CE23BF3F6}" type="slidenum">
+            <a:fld id="{47EAA666-569C-4A93-AF24-072D8E9E9B32}" type="slidenum">
               <a:rPr lang="en-US" smtClean="0"/>
               <a:t>‹#›</a:t>
             </a:fld>
@@ -515,7 +515,7 @@
     </p:spTree>
     <p:extLst>
       <p:ext uri="{BB962C8B-B14F-4D97-AF65-F5344CB8AC3E}">
-        <p14:creationId xmlns:p14="http://schemas.microsoft.com/office/powerpoint/2010/main" val="3278901769"/>
+        <p14:creationId xmlns:p14="http://schemas.microsoft.com/office/powerpoint/2010/main" val="4043933590"/>
       </p:ext>
     </p:extLst>
   </p:cSld>
@@ -547,7 +547,7 @@
           <p:cNvPr id="2" name="Vertical Title 1">
             <a:extLst>
               <a:ext uri="{FF2B5EF4-FFF2-40B4-BE49-F238E27FC236}">
-                <a16:creationId xmlns:a16="http://schemas.microsoft.com/office/drawing/2014/main" id="{A985F3B4-8C22-47CC-9735-4E5FC2246068}"/>
+                <a16:creationId xmlns:a16="http://schemas.microsoft.com/office/drawing/2014/main" id="{3156BD08-589B-45D6-91D5-B39449F090EE}"/>
               </a:ext>
             </a:extLst>
           </p:cNvPr>
@@ -580,7 +580,7 @@
           <p:cNvPr id="3" name="Vertical Text Placeholder 2">
             <a:extLst>
               <a:ext uri="{FF2B5EF4-FFF2-40B4-BE49-F238E27FC236}">
-                <a16:creationId xmlns:a16="http://schemas.microsoft.com/office/drawing/2014/main" id="{94FE7008-A205-435D-982C-5ACF02FA21C4}"/>
+                <a16:creationId xmlns:a16="http://schemas.microsoft.com/office/drawing/2014/main" id="{5FFC7DC0-0FAC-41E1-8408-914887A619C2}"/>
               </a:ext>
             </a:extLst>
           </p:cNvPr>
@@ -604,7 +604,7 @@
             <a:pPr lvl="0"/>
             <a:r>
               <a:rPr lang="en-US"/>
-              <a:t>Edit Master text styles</a:t>
+              <a:t>Click to edit Master text styles</a:t>
             </a:r>
           </a:p>
           <a:p>
@@ -642,7 +642,7 @@
           <p:cNvPr id="4" name="Date Placeholder 3">
             <a:extLst>
               <a:ext uri="{FF2B5EF4-FFF2-40B4-BE49-F238E27FC236}">
-                <a16:creationId xmlns:a16="http://schemas.microsoft.com/office/drawing/2014/main" id="{FF60CB9F-8C52-4FFF-B108-3A97689A45A1}"/>
+                <a16:creationId xmlns:a16="http://schemas.microsoft.com/office/drawing/2014/main" id="{012A2D45-28EA-4995-8DE8-2E206E600C09}"/>
               </a:ext>
             </a:extLst>
           </p:cNvPr>
@@ -658,9 +658,9 @@
           <a:bodyPr/>
           <a:lstStyle/>
           <a:p>
-            <a:fld id="{E73E616A-532A-4D23-BBC6-B7182C7A2775}" type="datetimeFigureOut">
+            <a:fld id="{ADF1A577-1697-417D-BE9A-F65F1F01BD18}" type="datetimeFigureOut">
               <a:rPr lang="en-US" smtClean="0"/>
-              <a:t>6/12/2019</a:t>
+              <a:t>1/21/2021</a:t>
             </a:fld>
             <a:endParaRPr lang="en-US"/>
           </a:p>
@@ -671,7 +671,7 @@
           <p:cNvPr id="5" name="Footer Placeholder 4">
             <a:extLst>
               <a:ext uri="{FF2B5EF4-FFF2-40B4-BE49-F238E27FC236}">
-                <a16:creationId xmlns:a16="http://schemas.microsoft.com/office/drawing/2014/main" id="{1F286A01-D1C9-4F54-BC69-E1BA5D55F562}"/>
+                <a16:creationId xmlns:a16="http://schemas.microsoft.com/office/drawing/2014/main" id="{235955E9-AC04-4356-9559-E07DB9158FFB}"/>
               </a:ext>
             </a:extLst>
           </p:cNvPr>
@@ -696,7 +696,7 @@
           <p:cNvPr id="6" name="Slide Number Placeholder 5">
             <a:extLst>
               <a:ext uri="{FF2B5EF4-FFF2-40B4-BE49-F238E27FC236}">
-                <a16:creationId xmlns:a16="http://schemas.microsoft.com/office/drawing/2014/main" id="{A617C735-B253-4536-AC35-ED163EC4BDFA}"/>
+                <a16:creationId xmlns:a16="http://schemas.microsoft.com/office/drawing/2014/main" id="{670DDE40-191E-4EA3-8497-9B23BFBE36B2}"/>
               </a:ext>
             </a:extLst>
           </p:cNvPr>
@@ -712,7 +712,7 @@
           <a:bodyPr/>
           <a:lstStyle/>
           <a:p>
-            <a:fld id="{28D51B86-B7C7-42BF-A1EE-4B0CE23BF3F6}" type="slidenum">
+            <a:fld id="{47EAA666-569C-4A93-AF24-072D8E9E9B32}" type="slidenum">
               <a:rPr lang="en-US" smtClean="0"/>
               <a:t>‹#›</a:t>
             </a:fld>
@@ -723,7 +723,7 @@
     </p:spTree>
     <p:extLst>
       <p:ext uri="{BB962C8B-B14F-4D97-AF65-F5344CB8AC3E}">
-        <p14:creationId xmlns:p14="http://schemas.microsoft.com/office/powerpoint/2010/main" val="2615709947"/>
+        <p14:creationId xmlns:p14="http://schemas.microsoft.com/office/powerpoint/2010/main" val="546445384"/>
       </p:ext>
     </p:extLst>
   </p:cSld>
@@ -755,7 +755,7 @@
           <p:cNvPr id="2" name="Title 1">
             <a:extLst>
               <a:ext uri="{FF2B5EF4-FFF2-40B4-BE49-F238E27FC236}">
-                <a16:creationId xmlns:a16="http://schemas.microsoft.com/office/drawing/2014/main" id="{BC01E198-BDCB-41B4-A4F2-CBD0BF63EF4B}"/>
+                <a16:creationId xmlns:a16="http://schemas.microsoft.com/office/drawing/2014/main" id="{79026385-2BE7-4CB8-B856-48E208519E31}"/>
               </a:ext>
             </a:extLst>
           </p:cNvPr>
@@ -783,7 +783,7 @@
           <p:cNvPr id="3" name="Content Placeholder 2">
             <a:extLst>
               <a:ext uri="{FF2B5EF4-FFF2-40B4-BE49-F238E27FC236}">
-                <a16:creationId xmlns:a16="http://schemas.microsoft.com/office/drawing/2014/main" id="{D9745CB2-E279-4813-96F7-0D53466CB4B0}"/>
+                <a16:creationId xmlns:a16="http://schemas.microsoft.com/office/drawing/2014/main" id="{9D70AD55-4695-4475-AD45-1E982535CAFB}"/>
               </a:ext>
             </a:extLst>
           </p:cNvPr>
@@ -802,7 +802,7 @@
             <a:pPr lvl="0"/>
             <a:r>
               <a:rPr lang="en-US"/>
-              <a:t>Edit Master text styles</a:t>
+              <a:t>Click to edit Master text styles</a:t>
             </a:r>
           </a:p>
           <a:p>
@@ -840,7 +840,7 @@
           <p:cNvPr id="4" name="Date Placeholder 3">
             <a:extLst>
               <a:ext uri="{FF2B5EF4-FFF2-40B4-BE49-F238E27FC236}">
-                <a16:creationId xmlns:a16="http://schemas.microsoft.com/office/drawing/2014/main" id="{5DEBB281-D460-4E37-84BC-DE35BAECE50F}"/>
+                <a16:creationId xmlns:a16="http://schemas.microsoft.com/office/drawing/2014/main" id="{942218E3-102B-4977-9F96-3A0AB8E5A4B2}"/>
               </a:ext>
             </a:extLst>
           </p:cNvPr>
@@ -856,9 +856,9 @@
           <a:bodyPr/>
           <a:lstStyle/>
           <a:p>
-            <a:fld id="{E73E616A-532A-4D23-BBC6-B7182C7A2775}" type="datetimeFigureOut">
+            <a:fld id="{ADF1A577-1697-417D-BE9A-F65F1F01BD18}" type="datetimeFigureOut">
               <a:rPr lang="en-US" smtClean="0"/>
-              <a:t>6/12/2019</a:t>
+              <a:t>1/21/2021</a:t>
             </a:fld>
             <a:endParaRPr lang="en-US"/>
           </a:p>
@@ -869,7 +869,7 @@
           <p:cNvPr id="5" name="Footer Placeholder 4">
             <a:extLst>
               <a:ext uri="{FF2B5EF4-FFF2-40B4-BE49-F238E27FC236}">
-                <a16:creationId xmlns:a16="http://schemas.microsoft.com/office/drawing/2014/main" id="{C57C3FA3-26BD-45A3-951C-643556ACED8E}"/>
+                <a16:creationId xmlns:a16="http://schemas.microsoft.com/office/drawing/2014/main" id="{8840068B-FBD8-4392-9D5F-AE6E5576054E}"/>
               </a:ext>
             </a:extLst>
           </p:cNvPr>
@@ -894,7 +894,7 @@
           <p:cNvPr id="6" name="Slide Number Placeholder 5">
             <a:extLst>
               <a:ext uri="{FF2B5EF4-FFF2-40B4-BE49-F238E27FC236}">
-                <a16:creationId xmlns:a16="http://schemas.microsoft.com/office/drawing/2014/main" id="{E9C18319-CDB3-4986-B912-1394CAF48529}"/>
+                <a16:creationId xmlns:a16="http://schemas.microsoft.com/office/drawing/2014/main" id="{E4302636-D995-4EC8-8312-FF91200B4A1A}"/>
               </a:ext>
             </a:extLst>
           </p:cNvPr>
@@ -910,7 +910,7 @@
           <a:bodyPr/>
           <a:lstStyle/>
           <a:p>
-            <a:fld id="{28D51B86-B7C7-42BF-A1EE-4B0CE23BF3F6}" type="slidenum">
+            <a:fld id="{47EAA666-569C-4A93-AF24-072D8E9E9B32}" type="slidenum">
               <a:rPr lang="en-US" smtClean="0"/>
               <a:t>‹#›</a:t>
             </a:fld>
@@ -921,7 +921,7 @@
     </p:spTree>
     <p:extLst>
       <p:ext uri="{BB962C8B-B14F-4D97-AF65-F5344CB8AC3E}">
-        <p14:creationId xmlns:p14="http://schemas.microsoft.com/office/powerpoint/2010/main" val="715933661"/>
+        <p14:creationId xmlns:p14="http://schemas.microsoft.com/office/powerpoint/2010/main" val="2990753716"/>
       </p:ext>
     </p:extLst>
   </p:cSld>
@@ -953,7 +953,7 @@
           <p:cNvPr id="2" name="Title 1">
             <a:extLst>
               <a:ext uri="{FF2B5EF4-FFF2-40B4-BE49-F238E27FC236}">
-                <a16:creationId xmlns:a16="http://schemas.microsoft.com/office/drawing/2014/main" id="{BE6E9955-B879-4C57-9BA9-91E0031DE27D}"/>
+                <a16:creationId xmlns:a16="http://schemas.microsoft.com/office/drawing/2014/main" id="{57E388CB-A290-4EA1-82A1-3349490CF0A2}"/>
               </a:ext>
             </a:extLst>
           </p:cNvPr>
@@ -990,7 +990,7 @@
           <p:cNvPr id="3" name="Text Placeholder 2">
             <a:extLst>
               <a:ext uri="{FF2B5EF4-FFF2-40B4-BE49-F238E27FC236}">
-                <a16:creationId xmlns:a16="http://schemas.microsoft.com/office/drawing/2014/main" id="{CD4B6D15-1566-456B-85C2-DBDB3E48D40C}"/>
+                <a16:creationId xmlns:a16="http://schemas.microsoft.com/office/drawing/2014/main" id="{C3035B35-2431-4B6D-93C4-F7509A2430C9}"/>
               </a:ext>
             </a:extLst>
           </p:cNvPr>
@@ -1105,7 +1105,7 @@
             <a:pPr lvl="0"/>
             <a:r>
               <a:rPr lang="en-US"/>
-              <a:t>Edit Master text styles</a:t>
+              <a:t>Click to edit Master text styles</a:t>
             </a:r>
           </a:p>
         </p:txBody>
@@ -1115,7 +1115,7 @@
           <p:cNvPr id="4" name="Date Placeholder 3">
             <a:extLst>
               <a:ext uri="{FF2B5EF4-FFF2-40B4-BE49-F238E27FC236}">
-                <a16:creationId xmlns:a16="http://schemas.microsoft.com/office/drawing/2014/main" id="{71B1D20B-5F3D-4201-8724-7DCE4BE21732}"/>
+                <a16:creationId xmlns:a16="http://schemas.microsoft.com/office/drawing/2014/main" id="{BB72478B-A707-4196-BDD2-82CE0E305A42}"/>
               </a:ext>
             </a:extLst>
           </p:cNvPr>
@@ -1131,9 +1131,9 @@
           <a:bodyPr/>
           <a:lstStyle/>
           <a:p>
-            <a:fld id="{E73E616A-532A-4D23-BBC6-B7182C7A2775}" type="datetimeFigureOut">
+            <a:fld id="{ADF1A577-1697-417D-BE9A-F65F1F01BD18}" type="datetimeFigureOut">
               <a:rPr lang="en-US" smtClean="0"/>
-              <a:t>6/12/2019</a:t>
+              <a:t>1/21/2021</a:t>
             </a:fld>
             <a:endParaRPr lang="en-US"/>
           </a:p>
@@ -1144,7 +1144,7 @@
           <p:cNvPr id="5" name="Footer Placeholder 4">
             <a:extLst>
               <a:ext uri="{FF2B5EF4-FFF2-40B4-BE49-F238E27FC236}">
-                <a16:creationId xmlns:a16="http://schemas.microsoft.com/office/drawing/2014/main" id="{858D59C4-DDD5-41AF-B4C4-3E357E7C38E3}"/>
+                <a16:creationId xmlns:a16="http://schemas.microsoft.com/office/drawing/2014/main" id="{5D1D11E1-8581-49A0-8A1E-116806DE2763}"/>
               </a:ext>
             </a:extLst>
           </p:cNvPr>
@@ -1169,7 +1169,7 @@
           <p:cNvPr id="6" name="Slide Number Placeholder 5">
             <a:extLst>
               <a:ext uri="{FF2B5EF4-FFF2-40B4-BE49-F238E27FC236}">
-                <a16:creationId xmlns:a16="http://schemas.microsoft.com/office/drawing/2014/main" id="{549CE067-98C8-4901-A43E-D402E4A97165}"/>
+                <a16:creationId xmlns:a16="http://schemas.microsoft.com/office/drawing/2014/main" id="{515F53C8-6B2B-498C-AB04-82130BB8F34A}"/>
               </a:ext>
             </a:extLst>
           </p:cNvPr>
@@ -1185,7 +1185,7 @@
           <a:bodyPr/>
           <a:lstStyle/>
           <a:p>
-            <a:fld id="{28D51B86-B7C7-42BF-A1EE-4B0CE23BF3F6}" type="slidenum">
+            <a:fld id="{47EAA666-569C-4A93-AF24-072D8E9E9B32}" type="slidenum">
               <a:rPr lang="en-US" smtClean="0"/>
               <a:t>‹#›</a:t>
             </a:fld>
@@ -1196,7 +1196,7 @@
     </p:spTree>
     <p:extLst>
       <p:ext uri="{BB962C8B-B14F-4D97-AF65-F5344CB8AC3E}">
-        <p14:creationId xmlns:p14="http://schemas.microsoft.com/office/powerpoint/2010/main" val="1887552929"/>
+        <p14:creationId xmlns:p14="http://schemas.microsoft.com/office/powerpoint/2010/main" val="2230602348"/>
       </p:ext>
     </p:extLst>
   </p:cSld>
@@ -1228,7 +1228,7 @@
           <p:cNvPr id="2" name="Title 1">
             <a:extLst>
               <a:ext uri="{FF2B5EF4-FFF2-40B4-BE49-F238E27FC236}">
-                <a16:creationId xmlns:a16="http://schemas.microsoft.com/office/drawing/2014/main" id="{730BB6C6-E923-4EE2-B0F1-EFFF08AD6A3F}"/>
+                <a16:creationId xmlns:a16="http://schemas.microsoft.com/office/drawing/2014/main" id="{F61F5D05-5D24-404D-A429-2AA1E4EED52B}"/>
               </a:ext>
             </a:extLst>
           </p:cNvPr>
@@ -1256,7 +1256,7 @@
           <p:cNvPr id="3" name="Content Placeholder 2">
             <a:extLst>
               <a:ext uri="{FF2B5EF4-FFF2-40B4-BE49-F238E27FC236}">
-                <a16:creationId xmlns:a16="http://schemas.microsoft.com/office/drawing/2014/main" id="{F3833056-01E7-4727-A527-A63D8CD220B8}"/>
+                <a16:creationId xmlns:a16="http://schemas.microsoft.com/office/drawing/2014/main" id="{DBA204FA-7D12-4342-B458-3087D15125A7}"/>
               </a:ext>
             </a:extLst>
           </p:cNvPr>
@@ -1280,7 +1280,7 @@
             <a:pPr lvl="0"/>
             <a:r>
               <a:rPr lang="en-US"/>
-              <a:t>Edit Master text styles</a:t>
+              <a:t>Click to edit Master text styles</a:t>
             </a:r>
           </a:p>
           <a:p>
@@ -1318,7 +1318,7 @@
           <p:cNvPr id="4" name="Content Placeholder 3">
             <a:extLst>
               <a:ext uri="{FF2B5EF4-FFF2-40B4-BE49-F238E27FC236}">
-                <a16:creationId xmlns:a16="http://schemas.microsoft.com/office/drawing/2014/main" id="{97D6D5EF-CE07-4193-A43A-200E1CC3ED30}"/>
+                <a16:creationId xmlns:a16="http://schemas.microsoft.com/office/drawing/2014/main" id="{EEA2A759-48CF-4647-BFC2-6FE2DD801264}"/>
               </a:ext>
             </a:extLst>
           </p:cNvPr>
@@ -1342,7 +1342,7 @@
             <a:pPr lvl="0"/>
             <a:r>
               <a:rPr lang="en-US"/>
-              <a:t>Edit Master text styles</a:t>
+              <a:t>Click to edit Master text styles</a:t>
             </a:r>
           </a:p>
           <a:p>
@@ -1380,7 +1380,7 @@
           <p:cNvPr id="5" name="Date Placeholder 4">
             <a:extLst>
               <a:ext uri="{FF2B5EF4-FFF2-40B4-BE49-F238E27FC236}">
-                <a16:creationId xmlns:a16="http://schemas.microsoft.com/office/drawing/2014/main" id="{F30C9DA3-7A0C-41CD-9670-2939A5911568}"/>
+                <a16:creationId xmlns:a16="http://schemas.microsoft.com/office/drawing/2014/main" id="{3B87E412-6FC5-49FC-9204-A65BE6BA69D2}"/>
               </a:ext>
             </a:extLst>
           </p:cNvPr>
@@ -1396,9 +1396,9 @@
           <a:bodyPr/>
           <a:lstStyle/>
           <a:p>
-            <a:fld id="{E73E616A-532A-4D23-BBC6-B7182C7A2775}" type="datetimeFigureOut">
+            <a:fld id="{ADF1A577-1697-417D-BE9A-F65F1F01BD18}" type="datetimeFigureOut">
               <a:rPr lang="en-US" smtClean="0"/>
-              <a:t>6/12/2019</a:t>
+              <a:t>1/21/2021</a:t>
             </a:fld>
             <a:endParaRPr lang="en-US"/>
           </a:p>
@@ -1409,7 +1409,7 @@
           <p:cNvPr id="6" name="Footer Placeholder 5">
             <a:extLst>
               <a:ext uri="{FF2B5EF4-FFF2-40B4-BE49-F238E27FC236}">
-                <a16:creationId xmlns:a16="http://schemas.microsoft.com/office/drawing/2014/main" id="{85DEEAAD-1120-4EAC-929E-36235B157310}"/>
+                <a16:creationId xmlns:a16="http://schemas.microsoft.com/office/drawing/2014/main" id="{3A3BF81A-121D-48F5-A302-7A1311AB7D38}"/>
               </a:ext>
             </a:extLst>
           </p:cNvPr>
@@ -1434,7 +1434,7 @@
           <p:cNvPr id="7" name="Slide Number Placeholder 6">
             <a:extLst>
               <a:ext uri="{FF2B5EF4-FFF2-40B4-BE49-F238E27FC236}">
-                <a16:creationId xmlns:a16="http://schemas.microsoft.com/office/drawing/2014/main" id="{BA941CFF-8447-44ED-9FAA-8172B178A3FD}"/>
+                <a16:creationId xmlns:a16="http://schemas.microsoft.com/office/drawing/2014/main" id="{039BC36E-7FCE-46EA-A8DB-6F4730E26855}"/>
               </a:ext>
             </a:extLst>
           </p:cNvPr>
@@ -1450,7 +1450,7 @@
           <a:bodyPr/>
           <a:lstStyle/>
           <a:p>
-            <a:fld id="{28D51B86-B7C7-42BF-A1EE-4B0CE23BF3F6}" type="slidenum">
+            <a:fld id="{47EAA666-569C-4A93-AF24-072D8E9E9B32}" type="slidenum">
               <a:rPr lang="en-US" smtClean="0"/>
               <a:t>‹#›</a:t>
             </a:fld>
@@ -1461,7 +1461,7 @@
     </p:spTree>
     <p:extLst>
       <p:ext uri="{BB962C8B-B14F-4D97-AF65-F5344CB8AC3E}">
-        <p14:creationId xmlns:p14="http://schemas.microsoft.com/office/powerpoint/2010/main" val="3952033978"/>
+        <p14:creationId xmlns:p14="http://schemas.microsoft.com/office/powerpoint/2010/main" val="2310831879"/>
       </p:ext>
     </p:extLst>
   </p:cSld>
@@ -1493,7 +1493,7 @@
           <p:cNvPr id="2" name="Title 1">
             <a:extLst>
               <a:ext uri="{FF2B5EF4-FFF2-40B4-BE49-F238E27FC236}">
-                <a16:creationId xmlns:a16="http://schemas.microsoft.com/office/drawing/2014/main" id="{83E1E2DA-3462-46D9-9A30-CD87CF9ABF8C}"/>
+                <a16:creationId xmlns:a16="http://schemas.microsoft.com/office/drawing/2014/main" id="{E4DCDAB8-56E0-44B3-8D4A-001D5F5E0006}"/>
               </a:ext>
             </a:extLst>
           </p:cNvPr>
@@ -1526,7 +1526,7 @@
           <p:cNvPr id="3" name="Text Placeholder 2">
             <a:extLst>
               <a:ext uri="{FF2B5EF4-FFF2-40B4-BE49-F238E27FC236}">
-                <a16:creationId xmlns:a16="http://schemas.microsoft.com/office/drawing/2014/main" id="{D0FAB880-D7CE-406C-A836-CDE92F35944D}"/>
+                <a16:creationId xmlns:a16="http://schemas.microsoft.com/office/drawing/2014/main" id="{42052A3C-C0CA-420F-8C33-412E98CDFEC1}"/>
               </a:ext>
             </a:extLst>
           </p:cNvPr>
@@ -1587,7 +1587,7 @@
             <a:pPr lvl="0"/>
             <a:r>
               <a:rPr lang="en-US"/>
-              <a:t>Edit Master text styles</a:t>
+              <a:t>Click to edit Master text styles</a:t>
             </a:r>
           </a:p>
         </p:txBody>
@@ -1597,7 +1597,7 @@
           <p:cNvPr id="4" name="Content Placeholder 3">
             <a:extLst>
               <a:ext uri="{FF2B5EF4-FFF2-40B4-BE49-F238E27FC236}">
-                <a16:creationId xmlns:a16="http://schemas.microsoft.com/office/drawing/2014/main" id="{7B195C89-6D17-46D6-A995-4ED3F2A75034}"/>
+                <a16:creationId xmlns:a16="http://schemas.microsoft.com/office/drawing/2014/main" id="{6CB6A4C6-CE8E-417E-BA0D-98E1BEFDABF0}"/>
               </a:ext>
             </a:extLst>
           </p:cNvPr>
@@ -1621,7 +1621,7 @@
             <a:pPr lvl="0"/>
             <a:r>
               <a:rPr lang="en-US"/>
-              <a:t>Edit Master text styles</a:t>
+              <a:t>Click to edit Master text styles</a:t>
             </a:r>
           </a:p>
           <a:p>
@@ -1659,7 +1659,7 @@
           <p:cNvPr id="5" name="Text Placeholder 4">
             <a:extLst>
               <a:ext uri="{FF2B5EF4-FFF2-40B4-BE49-F238E27FC236}">
-                <a16:creationId xmlns:a16="http://schemas.microsoft.com/office/drawing/2014/main" id="{EB8C9552-0A5F-416F-9F45-EFD62EB9BB83}"/>
+                <a16:creationId xmlns:a16="http://schemas.microsoft.com/office/drawing/2014/main" id="{19EBBE89-AEA6-4776-8CA8-D63C315D6A68}"/>
               </a:ext>
             </a:extLst>
           </p:cNvPr>
@@ -1720,7 +1720,7 @@
             <a:pPr lvl="0"/>
             <a:r>
               <a:rPr lang="en-US"/>
-              <a:t>Edit Master text styles</a:t>
+              <a:t>Click to edit Master text styles</a:t>
             </a:r>
           </a:p>
         </p:txBody>
@@ -1730,7 +1730,7 @@
           <p:cNvPr id="6" name="Content Placeholder 5">
             <a:extLst>
               <a:ext uri="{FF2B5EF4-FFF2-40B4-BE49-F238E27FC236}">
-                <a16:creationId xmlns:a16="http://schemas.microsoft.com/office/drawing/2014/main" id="{8E4CCEEA-F4AD-404C-8951-198C1DCA25C4}"/>
+                <a16:creationId xmlns:a16="http://schemas.microsoft.com/office/drawing/2014/main" id="{2EAFDD9A-6E88-4CE3-87FB-C94323EA8D95}"/>
               </a:ext>
             </a:extLst>
           </p:cNvPr>
@@ -1754,7 +1754,7 @@
             <a:pPr lvl="0"/>
             <a:r>
               <a:rPr lang="en-US"/>
-              <a:t>Edit Master text styles</a:t>
+              <a:t>Click to edit Master text styles</a:t>
             </a:r>
           </a:p>
           <a:p>
@@ -1792,7 +1792,7 @@
           <p:cNvPr id="7" name="Date Placeholder 6">
             <a:extLst>
               <a:ext uri="{FF2B5EF4-FFF2-40B4-BE49-F238E27FC236}">
-                <a16:creationId xmlns:a16="http://schemas.microsoft.com/office/drawing/2014/main" id="{FA2C43E9-E81C-4755-90A9-015F744E9F29}"/>
+                <a16:creationId xmlns:a16="http://schemas.microsoft.com/office/drawing/2014/main" id="{C8CB0CB7-1A92-408F-AD06-8766C9BCCDAE}"/>
               </a:ext>
             </a:extLst>
           </p:cNvPr>
@@ -1808,9 +1808,9 @@
           <a:bodyPr/>
           <a:lstStyle/>
           <a:p>
-            <a:fld id="{E73E616A-532A-4D23-BBC6-B7182C7A2775}" type="datetimeFigureOut">
+            <a:fld id="{ADF1A577-1697-417D-BE9A-F65F1F01BD18}" type="datetimeFigureOut">
               <a:rPr lang="en-US" smtClean="0"/>
-              <a:t>6/12/2019</a:t>
+              <a:t>1/21/2021</a:t>
             </a:fld>
             <a:endParaRPr lang="en-US"/>
           </a:p>
@@ -1821,7 +1821,7 @@
           <p:cNvPr id="8" name="Footer Placeholder 7">
             <a:extLst>
               <a:ext uri="{FF2B5EF4-FFF2-40B4-BE49-F238E27FC236}">
-                <a16:creationId xmlns:a16="http://schemas.microsoft.com/office/drawing/2014/main" id="{BC98AE20-5C5E-41A1-B1EF-5A7901347560}"/>
+                <a16:creationId xmlns:a16="http://schemas.microsoft.com/office/drawing/2014/main" id="{83784F4E-E5CF-4AE0-9234-F14FAC834EB9}"/>
               </a:ext>
             </a:extLst>
           </p:cNvPr>
@@ -1846,7 +1846,7 @@
           <p:cNvPr id="9" name="Slide Number Placeholder 8">
             <a:extLst>
               <a:ext uri="{FF2B5EF4-FFF2-40B4-BE49-F238E27FC236}">
-                <a16:creationId xmlns:a16="http://schemas.microsoft.com/office/drawing/2014/main" id="{7E6D883F-6E7D-465F-8B7D-7617D53BC2F6}"/>
+                <a16:creationId xmlns:a16="http://schemas.microsoft.com/office/drawing/2014/main" id="{93162DFA-4660-4683-9397-D730BF299EA1}"/>
               </a:ext>
             </a:extLst>
           </p:cNvPr>
@@ -1862,7 +1862,7 @@
           <a:bodyPr/>
           <a:lstStyle/>
           <a:p>
-            <a:fld id="{28D51B86-B7C7-42BF-A1EE-4B0CE23BF3F6}" type="slidenum">
+            <a:fld id="{47EAA666-569C-4A93-AF24-072D8E9E9B32}" type="slidenum">
               <a:rPr lang="en-US" smtClean="0"/>
               <a:t>‹#›</a:t>
             </a:fld>
@@ -1873,7 +1873,7 @@
     </p:spTree>
     <p:extLst>
       <p:ext uri="{BB962C8B-B14F-4D97-AF65-F5344CB8AC3E}">
-        <p14:creationId xmlns:p14="http://schemas.microsoft.com/office/powerpoint/2010/main" val="3582933302"/>
+        <p14:creationId xmlns:p14="http://schemas.microsoft.com/office/powerpoint/2010/main" val="4137189284"/>
       </p:ext>
     </p:extLst>
   </p:cSld>
@@ -1905,7 +1905,7 @@
           <p:cNvPr id="2" name="Title 1">
             <a:extLst>
               <a:ext uri="{FF2B5EF4-FFF2-40B4-BE49-F238E27FC236}">
-                <a16:creationId xmlns:a16="http://schemas.microsoft.com/office/drawing/2014/main" id="{83BA88B1-C872-4488-8FD7-021AE20DB046}"/>
+                <a16:creationId xmlns:a16="http://schemas.microsoft.com/office/drawing/2014/main" id="{0D1EAA2D-60DB-4805-86EB-868F2B1D3A18}"/>
               </a:ext>
             </a:extLst>
           </p:cNvPr>
@@ -1933,7 +1933,7 @@
           <p:cNvPr id="3" name="Date Placeholder 2">
             <a:extLst>
               <a:ext uri="{FF2B5EF4-FFF2-40B4-BE49-F238E27FC236}">
-                <a16:creationId xmlns:a16="http://schemas.microsoft.com/office/drawing/2014/main" id="{AB96F416-5998-498C-B316-52163EAC5BE5}"/>
+                <a16:creationId xmlns:a16="http://schemas.microsoft.com/office/drawing/2014/main" id="{2680C2EE-B56F-4940-9C54-A20A0C4B725C}"/>
               </a:ext>
             </a:extLst>
           </p:cNvPr>
@@ -1949,9 +1949,9 @@
           <a:bodyPr/>
           <a:lstStyle/>
           <a:p>
-            <a:fld id="{E73E616A-532A-4D23-BBC6-B7182C7A2775}" type="datetimeFigureOut">
+            <a:fld id="{ADF1A577-1697-417D-BE9A-F65F1F01BD18}" type="datetimeFigureOut">
               <a:rPr lang="en-US" smtClean="0"/>
-              <a:t>6/12/2019</a:t>
+              <a:t>1/21/2021</a:t>
             </a:fld>
             <a:endParaRPr lang="en-US"/>
           </a:p>
@@ -1962,7 +1962,7 @@
           <p:cNvPr id="4" name="Footer Placeholder 3">
             <a:extLst>
               <a:ext uri="{FF2B5EF4-FFF2-40B4-BE49-F238E27FC236}">
-                <a16:creationId xmlns:a16="http://schemas.microsoft.com/office/drawing/2014/main" id="{F784F399-753B-45AD-B509-63E8C1B69289}"/>
+                <a16:creationId xmlns:a16="http://schemas.microsoft.com/office/drawing/2014/main" id="{627C7803-7AFA-44A5-82CA-D03A645AE234}"/>
               </a:ext>
             </a:extLst>
           </p:cNvPr>
@@ -1987,7 +1987,7 @@
           <p:cNvPr id="5" name="Slide Number Placeholder 4">
             <a:extLst>
               <a:ext uri="{FF2B5EF4-FFF2-40B4-BE49-F238E27FC236}">
-                <a16:creationId xmlns:a16="http://schemas.microsoft.com/office/drawing/2014/main" id="{19A9E743-EF6E-4DC8-8AB7-495A36B74062}"/>
+                <a16:creationId xmlns:a16="http://schemas.microsoft.com/office/drawing/2014/main" id="{867126E7-0CBD-4C4A-88C5-5864E68DD24E}"/>
               </a:ext>
             </a:extLst>
           </p:cNvPr>
@@ -2003,7 +2003,7 @@
           <a:bodyPr/>
           <a:lstStyle/>
           <a:p>
-            <a:fld id="{28D51B86-B7C7-42BF-A1EE-4B0CE23BF3F6}" type="slidenum">
+            <a:fld id="{47EAA666-569C-4A93-AF24-072D8E9E9B32}" type="slidenum">
               <a:rPr lang="en-US" smtClean="0"/>
               <a:t>‹#›</a:t>
             </a:fld>
@@ -2014,7 +2014,7 @@
     </p:spTree>
     <p:extLst>
       <p:ext uri="{BB962C8B-B14F-4D97-AF65-F5344CB8AC3E}">
-        <p14:creationId xmlns:p14="http://schemas.microsoft.com/office/powerpoint/2010/main" val="1928657521"/>
+        <p14:creationId xmlns:p14="http://schemas.microsoft.com/office/powerpoint/2010/main" val="3744199606"/>
       </p:ext>
     </p:extLst>
   </p:cSld>
@@ -2046,7 +2046,7 @@
           <p:cNvPr id="2" name="Date Placeholder 1">
             <a:extLst>
               <a:ext uri="{FF2B5EF4-FFF2-40B4-BE49-F238E27FC236}">
-                <a16:creationId xmlns:a16="http://schemas.microsoft.com/office/drawing/2014/main" id="{4A702CBA-EAD9-42F2-8728-66742E750B89}"/>
+                <a16:creationId xmlns:a16="http://schemas.microsoft.com/office/drawing/2014/main" id="{A14128E7-CDBE-46B7-8E89-48664D333402}"/>
               </a:ext>
             </a:extLst>
           </p:cNvPr>
@@ -2062,9 +2062,9 @@
           <a:bodyPr/>
           <a:lstStyle/>
           <a:p>
-            <a:fld id="{E73E616A-532A-4D23-BBC6-B7182C7A2775}" type="datetimeFigureOut">
+            <a:fld id="{ADF1A577-1697-417D-BE9A-F65F1F01BD18}" type="datetimeFigureOut">
               <a:rPr lang="en-US" smtClean="0"/>
-              <a:t>6/12/2019</a:t>
+              <a:t>1/21/2021</a:t>
             </a:fld>
             <a:endParaRPr lang="en-US"/>
           </a:p>
@@ -2075,7 +2075,7 @@
           <p:cNvPr id="3" name="Footer Placeholder 2">
             <a:extLst>
               <a:ext uri="{FF2B5EF4-FFF2-40B4-BE49-F238E27FC236}">
-                <a16:creationId xmlns:a16="http://schemas.microsoft.com/office/drawing/2014/main" id="{9883998A-2DF7-4F62-832B-81282B20B0AE}"/>
+                <a16:creationId xmlns:a16="http://schemas.microsoft.com/office/drawing/2014/main" id="{F4C8CB59-0E6D-431E-BF75-CC0C9F38254F}"/>
               </a:ext>
             </a:extLst>
           </p:cNvPr>
@@ -2100,7 +2100,7 @@
           <p:cNvPr id="4" name="Slide Number Placeholder 3">
             <a:extLst>
               <a:ext uri="{FF2B5EF4-FFF2-40B4-BE49-F238E27FC236}">
-                <a16:creationId xmlns:a16="http://schemas.microsoft.com/office/drawing/2014/main" id="{18CC7CA5-74C2-42BC-BC19-ABAB58797F19}"/>
+                <a16:creationId xmlns:a16="http://schemas.microsoft.com/office/drawing/2014/main" id="{57D57E0E-5B19-44D9-9EA4-B52DD03CCA0A}"/>
               </a:ext>
             </a:extLst>
           </p:cNvPr>
@@ -2116,7 +2116,7 @@
           <a:bodyPr/>
           <a:lstStyle/>
           <a:p>
-            <a:fld id="{28D51B86-B7C7-42BF-A1EE-4B0CE23BF3F6}" type="slidenum">
+            <a:fld id="{47EAA666-569C-4A93-AF24-072D8E9E9B32}" type="slidenum">
               <a:rPr lang="en-US" smtClean="0"/>
               <a:t>‹#›</a:t>
             </a:fld>
@@ -2127,7 +2127,7 @@
     </p:spTree>
     <p:extLst>
       <p:ext uri="{BB962C8B-B14F-4D97-AF65-F5344CB8AC3E}">
-        <p14:creationId xmlns:p14="http://schemas.microsoft.com/office/powerpoint/2010/main" val="3551661147"/>
+        <p14:creationId xmlns:p14="http://schemas.microsoft.com/office/powerpoint/2010/main" val="1245570976"/>
       </p:ext>
     </p:extLst>
   </p:cSld>
@@ -2159,7 +2159,7 @@
           <p:cNvPr id="2" name="Title 1">
             <a:extLst>
               <a:ext uri="{FF2B5EF4-FFF2-40B4-BE49-F238E27FC236}">
-                <a16:creationId xmlns:a16="http://schemas.microsoft.com/office/drawing/2014/main" id="{4CEED2F9-8DA3-404B-B857-DD1A1F56A6A1}"/>
+                <a16:creationId xmlns:a16="http://schemas.microsoft.com/office/drawing/2014/main" id="{9030BF10-3957-491E-923D-3BE8F02A0EB8}"/>
               </a:ext>
             </a:extLst>
           </p:cNvPr>
@@ -2196,7 +2196,7 @@
           <p:cNvPr id="3" name="Content Placeholder 2">
             <a:extLst>
               <a:ext uri="{FF2B5EF4-FFF2-40B4-BE49-F238E27FC236}">
-                <a16:creationId xmlns:a16="http://schemas.microsoft.com/office/drawing/2014/main" id="{AE1D416C-1C19-4F17-B4AB-CF13D73A3B37}"/>
+                <a16:creationId xmlns:a16="http://schemas.microsoft.com/office/drawing/2014/main" id="{887A1AE8-C92E-4821-B600-C24B921D2BEE}"/>
               </a:ext>
             </a:extLst>
           </p:cNvPr>
@@ -2248,7 +2248,7 @@
             <a:pPr lvl="0"/>
             <a:r>
               <a:rPr lang="en-US"/>
-              <a:t>Edit Master text styles</a:t>
+              <a:t>Click to edit Master text styles</a:t>
             </a:r>
           </a:p>
           <a:p>
@@ -2286,7 +2286,7 @@
           <p:cNvPr id="4" name="Text Placeholder 3">
             <a:extLst>
               <a:ext uri="{FF2B5EF4-FFF2-40B4-BE49-F238E27FC236}">
-                <a16:creationId xmlns:a16="http://schemas.microsoft.com/office/drawing/2014/main" id="{145D7AD2-5533-48E9-85B6-7EE62ED50024}"/>
+                <a16:creationId xmlns:a16="http://schemas.microsoft.com/office/drawing/2014/main" id="{12631EA0-1878-42B6-89B7-2B4636584EDA}"/>
               </a:ext>
             </a:extLst>
           </p:cNvPr>
@@ -2347,7 +2347,7 @@
             <a:pPr lvl="0"/>
             <a:r>
               <a:rPr lang="en-US"/>
-              <a:t>Edit Master text styles</a:t>
+              <a:t>Click to edit Master text styles</a:t>
             </a:r>
           </a:p>
         </p:txBody>
@@ -2357,7 +2357,7 @@
           <p:cNvPr id="5" name="Date Placeholder 4">
             <a:extLst>
               <a:ext uri="{FF2B5EF4-FFF2-40B4-BE49-F238E27FC236}">
-                <a16:creationId xmlns:a16="http://schemas.microsoft.com/office/drawing/2014/main" id="{9F481ED8-6E57-49BF-931C-6F3AD95D7CA8}"/>
+                <a16:creationId xmlns:a16="http://schemas.microsoft.com/office/drawing/2014/main" id="{B97F8F8D-D7F9-43F9-AAAB-E908A9F55521}"/>
               </a:ext>
             </a:extLst>
           </p:cNvPr>
@@ -2373,9 +2373,9 @@
           <a:bodyPr/>
           <a:lstStyle/>
           <a:p>
-            <a:fld id="{E73E616A-532A-4D23-BBC6-B7182C7A2775}" type="datetimeFigureOut">
+            <a:fld id="{ADF1A577-1697-417D-BE9A-F65F1F01BD18}" type="datetimeFigureOut">
               <a:rPr lang="en-US" smtClean="0"/>
-              <a:t>6/12/2019</a:t>
+              <a:t>1/21/2021</a:t>
             </a:fld>
             <a:endParaRPr lang="en-US"/>
           </a:p>
@@ -2386,7 +2386,7 @@
           <p:cNvPr id="6" name="Footer Placeholder 5">
             <a:extLst>
               <a:ext uri="{FF2B5EF4-FFF2-40B4-BE49-F238E27FC236}">
-                <a16:creationId xmlns:a16="http://schemas.microsoft.com/office/drawing/2014/main" id="{D3DA77FC-33A7-4F90-9227-98FF1C4288DC}"/>
+                <a16:creationId xmlns:a16="http://schemas.microsoft.com/office/drawing/2014/main" id="{AB49F2BF-6EE8-4DDA-9AA9-7F18D2BD6706}"/>
               </a:ext>
             </a:extLst>
           </p:cNvPr>
@@ -2411,7 +2411,7 @@
           <p:cNvPr id="7" name="Slide Number Placeholder 6">
             <a:extLst>
               <a:ext uri="{FF2B5EF4-FFF2-40B4-BE49-F238E27FC236}">
-                <a16:creationId xmlns:a16="http://schemas.microsoft.com/office/drawing/2014/main" id="{DD3DB3A6-DA08-40AE-A95D-FB799F241EC7}"/>
+                <a16:creationId xmlns:a16="http://schemas.microsoft.com/office/drawing/2014/main" id="{B019D040-E4DD-4CD2-B329-0C5084C9DC8A}"/>
               </a:ext>
             </a:extLst>
           </p:cNvPr>
@@ -2427,7 +2427,7 @@
           <a:bodyPr/>
           <a:lstStyle/>
           <a:p>
-            <a:fld id="{28D51B86-B7C7-42BF-A1EE-4B0CE23BF3F6}" type="slidenum">
+            <a:fld id="{47EAA666-569C-4A93-AF24-072D8E9E9B32}" type="slidenum">
               <a:rPr lang="en-US" smtClean="0"/>
               <a:t>‹#›</a:t>
             </a:fld>
@@ -2438,7 +2438,7 @@
     </p:spTree>
     <p:extLst>
       <p:ext uri="{BB962C8B-B14F-4D97-AF65-F5344CB8AC3E}">
-        <p14:creationId xmlns:p14="http://schemas.microsoft.com/office/powerpoint/2010/main" val="533957868"/>
+        <p14:creationId xmlns:p14="http://schemas.microsoft.com/office/powerpoint/2010/main" val="3991175808"/>
       </p:ext>
     </p:extLst>
   </p:cSld>
@@ -2470,7 +2470,7 @@
           <p:cNvPr id="2" name="Title 1">
             <a:extLst>
               <a:ext uri="{FF2B5EF4-FFF2-40B4-BE49-F238E27FC236}">
-                <a16:creationId xmlns:a16="http://schemas.microsoft.com/office/drawing/2014/main" id="{9A9721AD-BC7E-492C-BB39-E2A9F3FBE1A9}"/>
+                <a16:creationId xmlns:a16="http://schemas.microsoft.com/office/drawing/2014/main" id="{3146C00B-0461-4D80-80D5-044807FF5070}"/>
               </a:ext>
             </a:extLst>
           </p:cNvPr>
@@ -2507,7 +2507,7 @@
           <p:cNvPr id="3" name="Picture Placeholder 2">
             <a:extLst>
               <a:ext uri="{FF2B5EF4-FFF2-40B4-BE49-F238E27FC236}">
-                <a16:creationId xmlns:a16="http://schemas.microsoft.com/office/drawing/2014/main" id="{31C4E3A8-4418-432D-962A-ED6372E6A545}"/>
+                <a16:creationId xmlns:a16="http://schemas.microsoft.com/office/drawing/2014/main" id="{0A8F50EA-8054-407F-9FBE-E52DDC4BF6F8}"/>
               </a:ext>
             </a:extLst>
           </p:cNvPr>
@@ -2574,7 +2574,7 @@
           <p:cNvPr id="4" name="Text Placeholder 3">
             <a:extLst>
               <a:ext uri="{FF2B5EF4-FFF2-40B4-BE49-F238E27FC236}">
-                <a16:creationId xmlns:a16="http://schemas.microsoft.com/office/drawing/2014/main" id="{E3861D91-DF35-4B56-A7E4-533C5E78C215}"/>
+                <a16:creationId xmlns:a16="http://schemas.microsoft.com/office/drawing/2014/main" id="{E093A040-2E2C-41E7-BF7B-8BD106246576}"/>
               </a:ext>
             </a:extLst>
           </p:cNvPr>
@@ -2635,7 +2635,7 @@
             <a:pPr lvl="0"/>
             <a:r>
               <a:rPr lang="en-US"/>
-              <a:t>Edit Master text styles</a:t>
+              <a:t>Click to edit Master text styles</a:t>
             </a:r>
           </a:p>
         </p:txBody>
@@ -2645,7 +2645,7 @@
           <p:cNvPr id="5" name="Date Placeholder 4">
             <a:extLst>
               <a:ext uri="{FF2B5EF4-FFF2-40B4-BE49-F238E27FC236}">
-                <a16:creationId xmlns:a16="http://schemas.microsoft.com/office/drawing/2014/main" id="{128C1BEB-EE1E-4FC3-94D4-0DD2B4FFB809}"/>
+                <a16:creationId xmlns:a16="http://schemas.microsoft.com/office/drawing/2014/main" id="{DBAD27FC-510E-4B46-8A53-01525EA443B9}"/>
               </a:ext>
             </a:extLst>
           </p:cNvPr>
@@ -2661,9 +2661,9 @@
           <a:bodyPr/>
           <a:lstStyle/>
           <a:p>
-            <a:fld id="{E73E616A-532A-4D23-BBC6-B7182C7A2775}" type="datetimeFigureOut">
+            <a:fld id="{ADF1A577-1697-417D-BE9A-F65F1F01BD18}" type="datetimeFigureOut">
               <a:rPr lang="en-US" smtClean="0"/>
-              <a:t>6/12/2019</a:t>
+              <a:t>1/21/2021</a:t>
             </a:fld>
             <a:endParaRPr lang="en-US"/>
           </a:p>
@@ -2674,7 +2674,7 @@
           <p:cNvPr id="6" name="Footer Placeholder 5">
             <a:extLst>
               <a:ext uri="{FF2B5EF4-FFF2-40B4-BE49-F238E27FC236}">
-                <a16:creationId xmlns:a16="http://schemas.microsoft.com/office/drawing/2014/main" id="{601EF39E-7A9B-4AB7-8709-657D40D8891E}"/>
+                <a16:creationId xmlns:a16="http://schemas.microsoft.com/office/drawing/2014/main" id="{E3AB162A-CD01-4698-9CDC-70EC24985DE4}"/>
               </a:ext>
             </a:extLst>
           </p:cNvPr>
@@ -2699,7 +2699,7 @@
           <p:cNvPr id="7" name="Slide Number Placeholder 6">
             <a:extLst>
               <a:ext uri="{FF2B5EF4-FFF2-40B4-BE49-F238E27FC236}">
-                <a16:creationId xmlns:a16="http://schemas.microsoft.com/office/drawing/2014/main" id="{6537C589-EFF0-4378-9EB5-E934E5422CA3}"/>
+                <a16:creationId xmlns:a16="http://schemas.microsoft.com/office/drawing/2014/main" id="{C46A9AA3-994E-4869-AC04-D0A5D3747F5D}"/>
               </a:ext>
             </a:extLst>
           </p:cNvPr>
@@ -2715,7 +2715,7 @@
           <a:bodyPr/>
           <a:lstStyle/>
           <a:p>
-            <a:fld id="{28D51B86-B7C7-42BF-A1EE-4B0CE23BF3F6}" type="slidenum">
+            <a:fld id="{47EAA666-569C-4A93-AF24-072D8E9E9B32}" type="slidenum">
               <a:rPr lang="en-US" smtClean="0"/>
               <a:t>‹#›</a:t>
             </a:fld>
@@ -2726,7 +2726,7 @@
     </p:spTree>
     <p:extLst>
       <p:ext uri="{BB962C8B-B14F-4D97-AF65-F5344CB8AC3E}">
-        <p14:creationId xmlns:p14="http://schemas.microsoft.com/office/powerpoint/2010/main" val="819404842"/>
+        <p14:creationId xmlns:p14="http://schemas.microsoft.com/office/powerpoint/2010/main" val="941220765"/>
       </p:ext>
     </p:extLst>
   </p:cSld>
@@ -2763,7 +2763,7 @@
           <p:cNvPr id="2" name="Title Placeholder 1">
             <a:extLst>
               <a:ext uri="{FF2B5EF4-FFF2-40B4-BE49-F238E27FC236}">
-                <a16:creationId xmlns:a16="http://schemas.microsoft.com/office/drawing/2014/main" id="{BC3D39FE-4EFC-4D0D-AE8E-524E073900D7}"/>
+                <a16:creationId xmlns:a16="http://schemas.microsoft.com/office/drawing/2014/main" id="{4EF42A2B-D514-4527-8BA2-D6C7E2BD2AE3}"/>
               </a:ext>
             </a:extLst>
           </p:cNvPr>
@@ -2801,7 +2801,7 @@
           <p:cNvPr id="3" name="Text Placeholder 2">
             <a:extLst>
               <a:ext uri="{FF2B5EF4-FFF2-40B4-BE49-F238E27FC236}">
-                <a16:creationId xmlns:a16="http://schemas.microsoft.com/office/drawing/2014/main" id="{352DDA6D-E926-4E36-AC0D-5087ECB75A6F}"/>
+                <a16:creationId xmlns:a16="http://schemas.microsoft.com/office/drawing/2014/main" id="{5FE916B5-D0DE-46BA-8FB2-51250DBFCE26}"/>
               </a:ext>
             </a:extLst>
           </p:cNvPr>
@@ -2830,7 +2830,7 @@
             <a:pPr lvl="0"/>
             <a:r>
               <a:rPr lang="en-US"/>
-              <a:t>Edit Master text styles</a:t>
+              <a:t>Click to edit Master text styles</a:t>
             </a:r>
           </a:p>
           <a:p>
@@ -2868,7 +2868,7 @@
           <p:cNvPr id="4" name="Date Placeholder 3">
             <a:extLst>
               <a:ext uri="{FF2B5EF4-FFF2-40B4-BE49-F238E27FC236}">
-                <a16:creationId xmlns:a16="http://schemas.microsoft.com/office/drawing/2014/main" id="{440DEFB7-6F94-4F1F-BA60-44068C984668}"/>
+                <a16:creationId xmlns:a16="http://schemas.microsoft.com/office/drawing/2014/main" id="{E20C5703-45F8-44EB-BCAF-D073F46DD6F1}"/>
               </a:ext>
             </a:extLst>
           </p:cNvPr>
@@ -2902,9 +2902,9 @@
             </a:lvl1pPr>
           </a:lstStyle>
           <a:p>
-            <a:fld id="{E73E616A-532A-4D23-BBC6-B7182C7A2775}" type="datetimeFigureOut">
+            <a:fld id="{ADF1A577-1697-417D-BE9A-F65F1F01BD18}" type="datetimeFigureOut">
               <a:rPr lang="en-US" smtClean="0"/>
-              <a:t>6/12/2019</a:t>
+              <a:t>1/21/2021</a:t>
             </a:fld>
             <a:endParaRPr lang="en-US"/>
           </a:p>
@@ -2915,7 +2915,7 @@
           <p:cNvPr id="5" name="Footer Placeholder 4">
             <a:extLst>
               <a:ext uri="{FF2B5EF4-FFF2-40B4-BE49-F238E27FC236}">
-                <a16:creationId xmlns:a16="http://schemas.microsoft.com/office/drawing/2014/main" id="{FB5B1D2E-9E1D-4FA7-A8B1-5858E6E82DD8}"/>
+                <a16:creationId xmlns:a16="http://schemas.microsoft.com/office/drawing/2014/main" id="{0478D5A1-7767-4FAB-9F4B-EEE6ECBAD431}"/>
               </a:ext>
             </a:extLst>
           </p:cNvPr>
@@ -2958,7 +2958,7 @@
           <p:cNvPr id="6" name="Slide Number Placeholder 5">
             <a:extLst>
               <a:ext uri="{FF2B5EF4-FFF2-40B4-BE49-F238E27FC236}">
-                <a16:creationId xmlns:a16="http://schemas.microsoft.com/office/drawing/2014/main" id="{BB52E712-E172-4C03-B9C7-71C0A90F1735}"/>
+                <a16:creationId xmlns:a16="http://schemas.microsoft.com/office/drawing/2014/main" id="{C77586BC-9C9C-403A-AD92-608E66DA6CD9}"/>
               </a:ext>
             </a:extLst>
           </p:cNvPr>
@@ -2992,7 +2992,7 @@
             </a:lvl1pPr>
           </a:lstStyle>
           <a:p>
-            <a:fld id="{28D51B86-B7C7-42BF-A1EE-4B0CE23BF3F6}" type="slidenum">
+            <a:fld id="{47EAA666-569C-4A93-AF24-072D8E9E9B32}" type="slidenum">
               <a:rPr lang="en-US" smtClean="0"/>
               <a:t>‹#›</a:t>
             </a:fld>
@@ -3003,7 +3003,7 @@
     </p:spTree>
     <p:extLst>
       <p:ext uri="{BB962C8B-B14F-4D97-AF65-F5344CB8AC3E}">
-        <p14:creationId xmlns:p14="http://schemas.microsoft.com/office/powerpoint/2010/main" val="2564309487"/>
+        <p14:creationId xmlns:p14="http://schemas.microsoft.com/office/powerpoint/2010/main" val="2825710802"/>
       </p:ext>
     </p:extLst>
   </p:cSld>
@@ -3323,10 +3323,10 @@
       </p:grpSpPr>
       <p:sp>
         <p:nvSpPr>
-          <p:cNvPr id="4" name="Pentagon 3">
-            <a:extLst>
-              <a:ext uri="{FF2B5EF4-FFF2-40B4-BE49-F238E27FC236}">
-                <a16:creationId xmlns:a16="http://schemas.microsoft.com/office/drawing/2014/main" id="{593A1D15-5095-4ECF-88DD-6C87ACD7EE23}"/>
+          <p:cNvPr id="4" name="Oval 3">
+            <a:extLst>
+              <a:ext uri="{FF2B5EF4-FFF2-40B4-BE49-F238E27FC236}">
+                <a16:creationId xmlns:a16="http://schemas.microsoft.com/office/drawing/2014/main" id="{6EB68C43-3A00-4F6A-ACD6-6EFD24AF17DA}"/>
               </a:ext>
             </a:extLst>
           </p:cNvPr>
@@ -3335,31 +3335,21 @@
         </p:nvSpPr>
         <p:spPr>
           <a:xfrm>
-            <a:off x="3338423" y="1535502"/>
-            <a:ext cx="2757577" cy="2501660"/>
+            <a:off x="3839970" y="1334616"/>
+            <a:ext cx="4114800" cy="4031673"/>
           </a:xfrm>
-          <a:prstGeom prst="pentagon">
+          <a:prstGeom prst="ellipse">
             <a:avLst/>
           </a:prstGeom>
           <a:solidFill>
-            <a:schemeClr val="bg1">
-              <a:lumMod val="85000"/>
-            </a:schemeClr>
+            <a:srgbClr val="559D66"/>
           </a:solidFill>
           <a:ln w="76200">
             <a:solidFill>
-              <a:schemeClr val="bg1">
-                <a:lumMod val="75000"/>
-              </a:schemeClr>
+              <a:srgbClr val="214F2F"/>
             </a:solidFill>
           </a:ln>
-          <a:effectLst>
-            <a:outerShdw blurRad="50800" dist="38100" dir="2700000" algn="tl" rotWithShape="0">
-              <a:prstClr val="black">
-                <a:alpha val="40000"/>
-              </a:prstClr>
-            </a:outerShdw>
-          </a:effectLst>
+          <a:effectLst/>
         </p:spPr>
         <p:style>
           <a:lnRef idx="2">
@@ -3382,131 +3372,54 @@
           <a:lstStyle/>
           <a:p>
             <a:pPr algn="ctr"/>
-            <a:endParaRPr lang="en-US" sz="4400" dirty="0">
-              <a:solidFill>
-                <a:schemeClr val="tx1">
-                  <a:lumMod val="65000"/>
-                  <a:lumOff val="35000"/>
-                </a:schemeClr>
-              </a:solidFill>
-            </a:endParaRPr>
-          </a:p>
-        </p:txBody>
-      </p:sp>
-      <p:sp>
-        <p:nvSpPr>
-          <p:cNvPr id="6" name="Pentagon 5">
-            <a:extLst>
-              <a:ext uri="{FF2B5EF4-FFF2-40B4-BE49-F238E27FC236}">
-                <a16:creationId xmlns:a16="http://schemas.microsoft.com/office/drawing/2014/main" id="{F692849B-8517-40B5-A4CD-C58CA916C921}"/>
-              </a:ext>
-            </a:extLst>
-          </p:cNvPr>
-          <p:cNvSpPr/>
+            <a:endParaRPr lang="en-US"/>
+          </a:p>
+        </p:txBody>
+      </p:sp>
+      <p:sp>
+        <p:nvSpPr>
+          <p:cNvPr id="5" name="TextBox 4">
+            <a:extLst>
+              <a:ext uri="{FF2B5EF4-FFF2-40B4-BE49-F238E27FC236}">
+                <a16:creationId xmlns:a16="http://schemas.microsoft.com/office/drawing/2014/main" id="{1FF30DE9-D356-4F8D-BF7D-F4261F805362}"/>
+              </a:ext>
+            </a:extLst>
+          </p:cNvPr>
+          <p:cNvSpPr txBox="1"/>
           <p:nvPr/>
         </p:nvSpPr>
         <p:spPr>
           <a:xfrm>
-            <a:off x="3608716" y="1773290"/>
-            <a:ext cx="2216989" cy="2026083"/>
+            <a:off x="3648776" y="1738059"/>
+            <a:ext cx="4447310" cy="2785378"/>
           </a:xfrm>
-          <a:prstGeom prst="pentagon">
+          <a:prstGeom prst="rect">
             <a:avLst/>
           </a:prstGeom>
-          <a:solidFill>
-            <a:schemeClr val="accent6">
-              <a:lumMod val="75000"/>
-            </a:schemeClr>
-          </a:solidFill>
-          <a:ln w="76200">
-            <a:solidFill>
-              <a:schemeClr val="bg1">
-                <a:lumMod val="95000"/>
-              </a:schemeClr>
-            </a:solidFill>
-          </a:ln>
+          <a:noFill/>
           <a:effectLst>
-            <a:outerShdw blurRad="50800" dist="38100" dir="2700000" algn="tl" rotWithShape="0">
+            <a:outerShdw blurRad="127000" dist="127000" dir="2700000" algn="tl" rotWithShape="0">
               <a:prstClr val="black">
                 <a:alpha val="40000"/>
               </a:prstClr>
             </a:outerShdw>
           </a:effectLst>
         </p:spPr>
-        <p:style>
-          <a:lnRef idx="2">
-            <a:schemeClr val="accent1">
-              <a:shade val="50000"/>
-            </a:schemeClr>
-          </a:lnRef>
-          <a:fillRef idx="1">
-            <a:schemeClr val="accent1"/>
-          </a:fillRef>
-          <a:effectRef idx="0">
-            <a:schemeClr val="accent1"/>
-          </a:effectRef>
-          <a:fontRef idx="minor">
-            <a:schemeClr val="lt1"/>
-          </a:fontRef>
-        </p:style>
-        <p:txBody>
-          <a:bodyPr rtlCol="0" anchor="ctr"/>
-          <a:lstStyle/>
-          <a:p>
-            <a:pPr algn="ctr"/>
-            <a:endParaRPr lang="en-US" sz="4400" dirty="0">
-              <a:solidFill>
-                <a:schemeClr val="tx1">
-                  <a:lumMod val="65000"/>
-                  <a:lumOff val="35000"/>
-                </a:schemeClr>
-              </a:solidFill>
-            </a:endParaRPr>
-          </a:p>
-        </p:txBody>
-      </p:sp>
-      <p:sp>
-        <p:nvSpPr>
-          <p:cNvPr id="5" name="Rectangle 4">
-            <a:extLst>
-              <a:ext uri="{FF2B5EF4-FFF2-40B4-BE49-F238E27FC236}">
-                <a16:creationId xmlns:a16="http://schemas.microsoft.com/office/drawing/2014/main" id="{A715853C-B82F-4F81-9FD9-C82EA3F3D4FF}"/>
-              </a:ext>
-            </a:extLst>
-          </p:cNvPr>
-          <p:cNvSpPr/>
-          <p:nvPr/>
-        </p:nvSpPr>
-        <p:spPr>
-          <a:xfrm>
-            <a:off x="3814879" y="2370832"/>
-            <a:ext cx="1804661" cy="830997"/>
-          </a:xfrm>
-          <a:prstGeom prst="rect">
-            <a:avLst/>
-          </a:prstGeom>
-          <a:effectLst>
-            <a:outerShdw blurRad="50800" dist="38100" dir="2700000" algn="tl" rotWithShape="0">
-              <a:prstClr val="black">
-                <a:alpha val="40000"/>
-              </a:prstClr>
-            </a:outerShdw>
-          </a:effectLst>
-        </p:spPr>
-        <p:txBody>
-          <a:bodyPr wrap="none">
+        <p:txBody>
+          <a:bodyPr wrap="square" rtlCol="0">
             <a:spAutoFit/>
           </a:bodyPr>
           <a:lstStyle/>
           <a:p>
             <a:pPr algn="ctr"/>
             <a:r>
-              <a:rPr lang="en-US" sz="4800" dirty="0">
+              <a:rPr lang="en-US" sz="17500" b="1">
                 <a:solidFill>
                   <a:schemeClr val="bg1"/>
                 </a:solidFill>
+                <a:cs typeface="Helvetica" panose="020B0604020202020204" pitchFamily="34" charset="0"/>
               </a:rPr>
-              <a:t>{ rest }</a:t>
+              <a:t>rest</a:t>
             </a:r>
           </a:p>
         </p:txBody>
@@ -3514,7 +3427,7 @@
     </p:spTree>
     <p:extLst>
       <p:ext uri="{BB962C8B-B14F-4D97-AF65-F5344CB8AC3E}">
-        <p14:creationId xmlns:p14="http://schemas.microsoft.com/office/powerpoint/2010/main" val="3972904419"/>
+        <p14:creationId xmlns:p14="http://schemas.microsoft.com/office/powerpoint/2010/main" val="2953130899"/>
       </p:ext>
     </p:extLst>
   </p:cSld>

</xml_diff>